<commit_message>
update ppt & readme
</commit_message>
<xml_diff>
--- a/Home Insurance dataset case study.pptx
+++ b/Home Insurance dataset case study.pptx
@@ -4105,13 +4105,25 @@
         <p:spPr/>
         <p:txBody>
           <a:bodyPr>
-            <a:normAutofit fontScale="92500" lnSpcReduction="10000"/>
+            <a:normAutofit fontScale="70000" lnSpcReduction="20000"/>
           </a:bodyPr>
           <a:lstStyle/>
+          <a:p>
+            <a:endParaRPr lang="en-GB" dirty="0"/>
+          </a:p>
           <a:p>
             <a:r>
               <a:rPr lang="en-GB" dirty="0"/>
               <a:t>Check the different plots and investigate features which have some ”gaps” in the values taken, if possible interacting with business people, to be sure this is not some outliers in the data</a:t>
+            </a:r>
+          </a:p>
+          <a:p>
+            <a:endParaRPr lang="en-GB" dirty="0"/>
+          </a:p>
+          <a:p>
+            <a:r>
+              <a:rPr lang="en-GB" dirty="0"/>
+              <a:t>Add some basic analysis based on the dates (not target-oriented) if we need to define a business strategy (it should be done at the right timing)</a:t>
             </a:r>
           </a:p>
           <a:p>

</xml_diff>